<commit_message>
Till Home Page Added
</commit_message>
<xml_diff>
--- a/1stProject/HR Analytics Slides ver1.pptx
+++ b/1stProject/HR Analytics Slides ver1.pptx
@@ -23,7 +23,8 @@
     <p:sldId id="322" r:id="rId17"/>
     <p:sldId id="323" r:id="rId18"/>
     <p:sldId id="324" r:id="rId19"/>
-    <p:sldId id="325" r:id="rId20"/>
+    <p:sldId id="350" r:id="rId20"/>
+    <p:sldId id="325" r:id="rId21"/>
   </p:sldIdLst>
   <p:sldSz cx="12192000" cy="6858000"/>
   <p:notesSz cx="6858000" cy="9144000"/>
@@ -277,7 +278,7 @@
           <a:p>
             <a:fld id="{845A48CF-A7EF-49A2-882F-2907A5EEF3F3}" type="datetimeFigureOut">
               <a:rPr lang="en-US" smtClean="0"/>
-              <a:t>8/15/2025</a:t>
+              <a:t>8/21/2025</a:t>
             </a:fld>
             <a:endParaRPr lang="en-US"/>
           </a:p>
@@ -475,7 +476,7 @@
           <a:p>
             <a:fld id="{845A48CF-A7EF-49A2-882F-2907A5EEF3F3}" type="datetimeFigureOut">
               <a:rPr lang="en-US" smtClean="0"/>
-              <a:t>8/15/2025</a:t>
+              <a:t>8/21/2025</a:t>
             </a:fld>
             <a:endParaRPr lang="en-US"/>
           </a:p>
@@ -683,7 +684,7 @@
           <a:p>
             <a:fld id="{845A48CF-A7EF-49A2-882F-2907A5EEF3F3}" type="datetimeFigureOut">
               <a:rPr lang="en-US" smtClean="0"/>
-              <a:t>8/15/2025</a:t>
+              <a:t>8/21/2025</a:t>
             </a:fld>
             <a:endParaRPr lang="en-US"/>
           </a:p>
@@ -881,7 +882,7 @@
           <a:p>
             <a:fld id="{845A48CF-A7EF-49A2-882F-2907A5EEF3F3}" type="datetimeFigureOut">
               <a:rPr lang="en-US" smtClean="0"/>
-              <a:t>8/15/2025</a:t>
+              <a:t>8/21/2025</a:t>
             </a:fld>
             <a:endParaRPr lang="en-US"/>
           </a:p>
@@ -1156,7 +1157,7 @@
           <a:p>
             <a:fld id="{845A48CF-A7EF-49A2-882F-2907A5EEF3F3}" type="datetimeFigureOut">
               <a:rPr lang="en-US" smtClean="0"/>
-              <a:t>8/15/2025</a:t>
+              <a:t>8/21/2025</a:t>
             </a:fld>
             <a:endParaRPr lang="en-US"/>
           </a:p>
@@ -1421,7 +1422,7 @@
           <a:p>
             <a:fld id="{845A48CF-A7EF-49A2-882F-2907A5EEF3F3}" type="datetimeFigureOut">
               <a:rPr lang="en-US" smtClean="0"/>
-              <a:t>8/15/2025</a:t>
+              <a:t>8/21/2025</a:t>
             </a:fld>
             <a:endParaRPr lang="en-US"/>
           </a:p>
@@ -1833,7 +1834,7 @@
           <a:p>
             <a:fld id="{845A48CF-A7EF-49A2-882F-2907A5EEF3F3}" type="datetimeFigureOut">
               <a:rPr lang="en-US" smtClean="0"/>
-              <a:t>8/15/2025</a:t>
+              <a:t>8/21/2025</a:t>
             </a:fld>
             <a:endParaRPr lang="en-US"/>
           </a:p>
@@ -1974,7 +1975,7 @@
           <a:p>
             <a:fld id="{845A48CF-A7EF-49A2-882F-2907A5EEF3F3}" type="datetimeFigureOut">
               <a:rPr lang="en-US" smtClean="0"/>
-              <a:t>8/15/2025</a:t>
+              <a:t>8/21/2025</a:t>
             </a:fld>
             <a:endParaRPr lang="en-US"/>
           </a:p>
@@ -2087,7 +2088,7 @@
           <a:p>
             <a:fld id="{845A48CF-A7EF-49A2-882F-2907A5EEF3F3}" type="datetimeFigureOut">
               <a:rPr lang="en-US" smtClean="0"/>
-              <a:t>8/15/2025</a:t>
+              <a:t>8/21/2025</a:t>
             </a:fld>
             <a:endParaRPr lang="en-US"/>
           </a:p>
@@ -2398,7 +2399,7 @@
           <a:p>
             <a:fld id="{845A48CF-A7EF-49A2-882F-2907A5EEF3F3}" type="datetimeFigureOut">
               <a:rPr lang="en-US" smtClean="0"/>
-              <a:t>8/15/2025</a:t>
+              <a:t>8/21/2025</a:t>
             </a:fld>
             <a:endParaRPr lang="en-US"/>
           </a:p>
@@ -2686,7 +2687,7 @@
           <a:p>
             <a:fld id="{845A48CF-A7EF-49A2-882F-2907A5EEF3F3}" type="datetimeFigureOut">
               <a:rPr lang="en-US" smtClean="0"/>
-              <a:t>8/15/2025</a:t>
+              <a:t>8/21/2025</a:t>
             </a:fld>
             <a:endParaRPr lang="en-US"/>
           </a:p>
@@ -2927,7 +2928,7 @@
           <a:p>
             <a:fld id="{845A48CF-A7EF-49A2-882F-2907A5EEF3F3}" type="datetimeFigureOut">
               <a:rPr lang="en-US" smtClean="0"/>
-              <a:t>8/15/2025</a:t>
+              <a:t>8/21/2025</a:t>
             </a:fld>
             <a:endParaRPr lang="en-US"/>
           </a:p>
@@ -4053,7 +4054,13 @@
   <p:cSld>
     <p:spTree>
       <p:nvGrpSpPr>
-        <p:cNvPr id="1" name=""/>
+        <p:cNvPr id="1" name="">
+          <a:extLst>
+            <a:ext uri="{FF2B5EF4-FFF2-40B4-BE49-F238E27FC236}">
+              <a16:creationId xmlns:a16="http://schemas.microsoft.com/office/drawing/2014/main" id="{F6D79AE1-DEA2-B60C-E347-54824C591A3F}"/>
+            </a:ext>
+          </a:extLst>
+        </p:cNvPr>
         <p:cNvGrpSpPr/>
         <p:nvPr/>
       </p:nvGrpSpPr>
@@ -4067,55 +4074,38 @@
       </p:grpSpPr>
       <p:pic>
         <p:nvPicPr>
-          <p:cNvPr id="24578" name="Picture 2">
-            <a:extLst>
-              <a:ext uri="{FF2B5EF4-FFF2-40B4-BE49-F238E27FC236}">
-                <a16:creationId xmlns:a16="http://schemas.microsoft.com/office/drawing/2014/main" id="{15943C91-8783-D76B-514B-6A2C1077803B}"/>
+          <p:cNvPr id="9" name="Picture 8">
+            <a:extLst>
+              <a:ext uri="{FF2B5EF4-FFF2-40B4-BE49-F238E27FC236}">
+                <a16:creationId xmlns:a16="http://schemas.microsoft.com/office/drawing/2014/main" id="{93613DD1-E400-AC64-FB4E-6B6072AEE03F}"/>
               </a:ext>
             </a:extLst>
           </p:cNvPr>
           <p:cNvPicPr>
-            <a:picLocks noChangeAspect="1" noChangeArrowheads="1"/>
+            <a:picLocks noChangeAspect="1"/>
           </p:cNvPicPr>
           <p:nvPr/>
         </p:nvPicPr>
         <p:blipFill>
-          <a:blip r:embed="rId2">
-            <a:extLst>
-              <a:ext uri="{28A0092B-C50C-407E-A947-70E740481C1C}">
-                <a14:useLocalDpi xmlns:a14="http://schemas.microsoft.com/office/drawing/2010/main" val="0"/>
-              </a:ext>
-            </a:extLst>
-          </a:blip>
-          <a:srcRect/>
+          <a:blip r:embed="rId2"/>
           <a:stretch>
             <a:fillRect/>
           </a:stretch>
         </p:blipFill>
-        <p:spPr bwMode="auto">
+        <p:spPr>
           <a:xfrm>
-            <a:off x="0" y="0"/>
-            <a:ext cx="12192000" cy="6858000"/>
+            <a:off x="0" y="1234979"/>
+            <a:ext cx="12192000" cy="4575885"/>
           </a:xfrm>
           <a:prstGeom prst="rect">
             <a:avLst/>
           </a:prstGeom>
-          <a:noFill/>
-          <a:extLst>
-            <a:ext uri="{909E8E84-426E-40DD-AFC4-6F175D3DCCD1}">
-              <a14:hiddenFill xmlns:a14="http://schemas.microsoft.com/office/drawing/2010/main">
-                <a:solidFill>
-                  <a:srgbClr val="FFFFFF"/>
-                </a:solidFill>
-              </a14:hiddenFill>
-            </a:ext>
-          </a:extLst>
         </p:spPr>
       </p:pic>
     </p:spTree>
     <p:extLst>
       <p:ext uri="{BB962C8B-B14F-4D97-AF65-F5344CB8AC3E}">
-        <p14:creationId xmlns:p14="http://schemas.microsoft.com/office/powerpoint/2010/main" val="3755505376"/>
+        <p14:creationId xmlns:p14="http://schemas.microsoft.com/office/powerpoint/2010/main" val="2034974183"/>
       </p:ext>
     </p:extLst>
   </p:cSld>
@@ -4182,6 +4172,83 @@
     <p:extLst>
       <p:ext uri="{BB962C8B-B14F-4D97-AF65-F5344CB8AC3E}">
         <p14:creationId xmlns:p14="http://schemas.microsoft.com/office/powerpoint/2010/main" val="1754198689"/>
+      </p:ext>
+    </p:extLst>
+  </p:cSld>
+  <p:clrMapOvr>
+    <a:masterClrMapping/>
+  </p:clrMapOvr>
+</p:sld>
+</file>
+
+<file path=ppt/slides/slide20.xml><?xml version="1.0" encoding="utf-8"?>
+<p:sld xmlns:a="http://schemas.openxmlformats.org/drawingml/2006/main" xmlns:r="http://schemas.openxmlformats.org/officeDocument/2006/relationships" xmlns:p="http://schemas.openxmlformats.org/presentationml/2006/main">
+  <p:cSld>
+    <p:spTree>
+      <p:nvGrpSpPr>
+        <p:cNvPr id="1" name=""/>
+        <p:cNvGrpSpPr/>
+        <p:nvPr/>
+      </p:nvGrpSpPr>
+      <p:grpSpPr>
+        <a:xfrm>
+          <a:off x="0" y="0"/>
+          <a:ext cx="0" cy="0"/>
+          <a:chOff x="0" y="0"/>
+          <a:chExt cx="0" cy="0"/>
+        </a:xfrm>
+      </p:grpSpPr>
+      <p:pic>
+        <p:nvPicPr>
+          <p:cNvPr id="24578" name="Picture 2">
+            <a:extLst>
+              <a:ext uri="{FF2B5EF4-FFF2-40B4-BE49-F238E27FC236}">
+                <a16:creationId xmlns:a16="http://schemas.microsoft.com/office/drawing/2014/main" id="{15943C91-8783-D76B-514B-6A2C1077803B}"/>
+              </a:ext>
+            </a:extLst>
+          </p:cNvPr>
+          <p:cNvPicPr>
+            <a:picLocks noChangeAspect="1" noChangeArrowheads="1"/>
+          </p:cNvPicPr>
+          <p:nvPr/>
+        </p:nvPicPr>
+        <p:blipFill>
+          <a:blip r:embed="rId2">
+            <a:extLst>
+              <a:ext uri="{28A0092B-C50C-407E-A947-70E740481C1C}">
+                <a14:useLocalDpi xmlns:a14="http://schemas.microsoft.com/office/drawing/2010/main" val="0"/>
+              </a:ext>
+            </a:extLst>
+          </a:blip>
+          <a:srcRect/>
+          <a:stretch>
+            <a:fillRect/>
+          </a:stretch>
+        </p:blipFill>
+        <p:spPr bwMode="auto">
+          <a:xfrm>
+            <a:off x="0" y="0"/>
+            <a:ext cx="12192000" cy="6858000"/>
+          </a:xfrm>
+          <a:prstGeom prst="rect">
+            <a:avLst/>
+          </a:prstGeom>
+          <a:noFill/>
+          <a:extLst>
+            <a:ext uri="{909E8E84-426E-40DD-AFC4-6F175D3DCCD1}">
+              <a14:hiddenFill xmlns:a14="http://schemas.microsoft.com/office/drawing/2010/main">
+                <a:solidFill>
+                  <a:srgbClr val="FFFFFF"/>
+                </a:solidFill>
+              </a14:hiddenFill>
+            </a:ext>
+          </a:extLst>
+        </p:spPr>
+      </p:pic>
+    </p:spTree>
+    <p:extLst>
+      <p:ext uri="{BB962C8B-B14F-4D97-AF65-F5344CB8AC3E}">
+        <p14:creationId xmlns:p14="http://schemas.microsoft.com/office/powerpoint/2010/main" val="3755505376"/>
       </p:ext>
     </p:extLst>
   </p:cSld>

</xml_diff>